<commit_message>
updates to scoring on the SL follow-up/ISDP poster
</commit_message>
<xml_diff>
--- a/presentations/ISDP_template.pptx
+++ b/presentations/ISDP_template.pptx
@@ -262,7 +262,7 @@
       <p15:sldGuideLst xmlns:p15="http://schemas.microsoft.com/office/powerpoint/2012/main"/>
     </p:ext>
     <p:ext uri="http://customooxmlschemas.google.com/">
-      <go:slidesCustomData xmlns:go="http://customooxmlschemas.google.com/" xmlns:ahyp="http://schemas.microsoft.com/office/drawing/2018/hyperlinkcolor" xmlns:p15="http://schemas.microsoft.com/office/powerpoint/2012/main" xmlns:p14="http://schemas.microsoft.com/office/powerpoint/2010/main" xmlns:com="http://schemas.openxmlformats.org/drawingml/2006/compatibility" xmlns:pvml="urn:schemas-microsoft-com:office:powerpoint" xmlns:v="urn:schemas-microsoft-com:vml" xmlns:o="urn:schemas-microsoft-com:office:office" xmlns:dgm="http://schemas.openxmlformats.org/drawingml/2006/diagram" xmlns:c="http://schemas.openxmlformats.org/drawingml/2006/chart" xmlns:mv="urn:schemas-microsoft-com:mac:vml" xmlns:mc="http://schemas.openxmlformats.org/markup-compatibility/2006" xmlns="" r:id="rId12" roundtripDataSignature="AMtx7mgUZ/EanI988gELEzf8evnhnh3MyA=="/>
+      <go:slidesCustomData xmlns="" xmlns:mc="http://schemas.openxmlformats.org/markup-compatibility/2006" xmlns:mv="urn:schemas-microsoft-com:mac:vml" xmlns:c="http://schemas.openxmlformats.org/drawingml/2006/chart" xmlns:dgm="http://schemas.openxmlformats.org/drawingml/2006/diagram" xmlns:o="urn:schemas-microsoft-com:office:office" xmlns:v="urn:schemas-microsoft-com:vml" xmlns:pvml="urn:schemas-microsoft-com:office:powerpoint" xmlns:com="http://schemas.openxmlformats.org/drawingml/2006/compatibility" xmlns:p14="http://schemas.microsoft.com/office/powerpoint/2010/main" xmlns:p15="http://schemas.microsoft.com/office/powerpoint/2012/main" xmlns:ahyp="http://schemas.microsoft.com/office/drawing/2018/hyperlinkcolor" xmlns:go="http://customooxmlschemas.google.com/" r:id="rId12" roundtripDataSignature="AMtx7mgUZ/EanI988gELEzf8evnhnh3MyA=="/>
     </p:ext>
   </p:extLst>
 </p:presentation>
@@ -9590,7 +9590,7 @@
         </p:nvSpPr>
         <p:spPr>
           <a:xfrm>
-            <a:off x="685537" y="18340761"/>
+            <a:off x="615152" y="11660457"/>
             <a:ext cx="13880592" cy="2004578"/>
           </a:xfrm>
           <a:prstGeom prst="rect">
@@ -9637,7 +9637,7 @@
                 <a:latin typeface="Arial" panose="020B0604020202020204" pitchFamily="34" charset="0"/>
                 <a:cs typeface="Arial" panose="020B0604020202020204" pitchFamily="34" charset="0"/>
               </a:rPr>
-              <a:t>: Individuals who have experienced higher levels of early life adversity (across all dimensions) will demonstrate lower music-reward sensitivity. This relationship will be mediated by levels of general anhedonia.</a:t>
+              <a:t>: Individuals who have experienced higher levels of early life adversity (across all dimensions) will demonstrate lower music-reward sensitivity.</a:t>
             </a:r>
             <a:endParaRPr sz="3200" dirty="0">
               <a:latin typeface="Arial" panose="020B0604020202020204" pitchFamily="34" charset="0"/>
@@ -9836,8 +9836,8 @@
         </p:nvSpPr>
         <p:spPr>
           <a:xfrm>
-            <a:off x="15013484" y="6830829"/>
-            <a:ext cx="13877365" cy="31116771"/>
+            <a:off x="14658944" y="17031168"/>
+            <a:ext cx="13877365" cy="20872280"/>
           </a:xfrm>
           <a:prstGeom prst="rect">
             <a:avLst/>
@@ -9862,9 +9862,78 @@
               <a:buFont typeface="Arial" panose="020B0604020202020204" pitchFamily="34" charset="0"/>
               <a:buChar char="•"/>
             </a:pPr>
-            <a:endParaRPr lang="en-US" sz="3200" kern="1200" dirty="0">
+            <a:r>
+              <a:rPr lang="en-US" sz="3200" dirty="0">
+                <a:solidFill>
+                  <a:schemeClr val="dk1"/>
+                </a:solidFill>
+                <a:latin typeface="Arial" panose="020B0604020202020204" pitchFamily="34" charset="0"/>
+                <a:ea typeface="Helvetica Neue"/>
+                <a:cs typeface="Arial" panose="020B0604020202020204" pitchFamily="34" charset="0"/>
+                <a:sym typeface="Helvetica Neue"/>
+              </a:rPr>
+              <a:t>Early life adversity is associated with more reported absorption in music cross all dimensions</a:t>
+            </a:r>
+          </a:p>
+          <a:p>
+            <a:pPr marL="457200" indent="-457200" fontAlgn="base">
+              <a:buFont typeface="Arial" panose="020B0604020202020204" pitchFamily="34" charset="0"/>
+              <a:buChar char="•"/>
+            </a:pPr>
+            <a:r>
+              <a:rPr lang="en-US" sz="3200" dirty="0">
+                <a:solidFill>
+                  <a:schemeClr val="dk1"/>
+                </a:solidFill>
+                <a:latin typeface="Arial" panose="020B0604020202020204" pitchFamily="34" charset="0"/>
+                <a:ea typeface="Helvetica Neue"/>
+                <a:cs typeface="Arial" panose="020B0604020202020204" pitchFamily="34" charset="0"/>
+                <a:sym typeface="Helvetica Neue"/>
+              </a:rPr>
+              <a:t>Absorption positively correlated with resilience and healthy music usage, suggesting it can serve an adaptive purpose</a:t>
+            </a:r>
+          </a:p>
+          <a:p>
+            <a:pPr marL="457200" indent="-457200" fontAlgn="base">
+              <a:buFont typeface="Arial" panose="020B0604020202020204" pitchFamily="34" charset="0"/>
+              <a:buChar char="•"/>
+            </a:pPr>
+            <a:r>
+              <a:rPr lang="en-US" sz="3200" dirty="0">
+                <a:solidFill>
+                  <a:schemeClr val="dk1"/>
+                </a:solidFill>
+                <a:latin typeface="Arial" panose="020B0604020202020204" pitchFamily="34" charset="0"/>
+                <a:ea typeface="Helvetica Neue"/>
+                <a:cs typeface="Arial" panose="020B0604020202020204" pitchFamily="34" charset="0"/>
+                <a:sym typeface="Helvetica Neue"/>
+              </a:rPr>
+              <a:t>Items on the unhealthy music usage scale index music listening as a form of escapism (e.g. “I hide in my music because nobody understands me, and it blocks people out),</a:t>
+            </a:r>
+          </a:p>
+          <a:p>
+            <a:pPr marL="457200" indent="-457200" fontAlgn="base">
+              <a:buFont typeface="Arial" panose="020B0604020202020204" pitchFamily="34" charset="0"/>
+              <a:buChar char="•"/>
+            </a:pPr>
+            <a:r>
+              <a:rPr lang="en-US" sz="3200" dirty="0">
+                <a:solidFill>
+                  <a:schemeClr val="dk1"/>
+                </a:solidFill>
+                <a:latin typeface="Arial" panose="020B0604020202020204" pitchFamily="34" charset="0"/>
+                <a:ea typeface="Helvetica Neue"/>
+                <a:cs typeface="Arial" panose="020B0604020202020204" pitchFamily="34" charset="0"/>
+                <a:sym typeface="Helvetica Neue"/>
+              </a:rPr>
+              <a:t>In adverse contexts, such escapism might be adaptive, explaining why absorption in music is positively related to experiences of adversity</a:t>
+            </a:r>
+          </a:p>
+          <a:p>
+            <a:pPr fontAlgn="base"/>
+            <a:endParaRPr lang="en-US" sz="3200" dirty="0">
               <a:solidFill>
-                <a:schemeClr val="tx1"/>
+                <a:schemeClr val="dk1"/>
               </a:solidFill>
               <a:latin typeface="Arial" panose="020B0604020202020204" pitchFamily="34" charset="0"/>
               <a:ea typeface="Helvetica Neue"/>
@@ -9874,9 +9943,105 @@
           </a:p>
           <a:p>
             <a:pPr fontAlgn="base"/>
-            <a:endParaRPr lang="en-US" sz="3200" kern="1200" dirty="0">
+            <a:endParaRPr lang="en-US" sz="3200" dirty="0">
               <a:solidFill>
-                <a:schemeClr val="tx1"/>
+                <a:schemeClr val="dk1"/>
+              </a:solidFill>
+              <a:latin typeface="Arial" panose="020B0604020202020204" pitchFamily="34" charset="0"/>
+              <a:ea typeface="Helvetica Neue"/>
+              <a:cs typeface="Arial" panose="020B0604020202020204" pitchFamily="34" charset="0"/>
+              <a:sym typeface="Helvetica Neue"/>
+            </a:endParaRPr>
+          </a:p>
+          <a:p>
+            <a:pPr fontAlgn="base"/>
+            <a:endParaRPr lang="en-US" sz="3200" dirty="0">
+              <a:solidFill>
+                <a:schemeClr val="dk1"/>
+              </a:solidFill>
+              <a:latin typeface="Arial" panose="020B0604020202020204" pitchFamily="34" charset="0"/>
+              <a:ea typeface="Helvetica Neue"/>
+              <a:cs typeface="Arial" panose="020B0604020202020204" pitchFamily="34" charset="0"/>
+              <a:sym typeface="Helvetica Neue"/>
+            </a:endParaRPr>
+          </a:p>
+          <a:p>
+            <a:pPr fontAlgn="base"/>
+            <a:endParaRPr lang="en-US" sz="3200" dirty="0">
+              <a:solidFill>
+                <a:schemeClr val="dk1"/>
+              </a:solidFill>
+              <a:latin typeface="Arial" panose="020B0604020202020204" pitchFamily="34" charset="0"/>
+              <a:ea typeface="Helvetica Neue"/>
+              <a:cs typeface="Arial" panose="020B0604020202020204" pitchFamily="34" charset="0"/>
+              <a:sym typeface="Helvetica Neue"/>
+            </a:endParaRPr>
+          </a:p>
+          <a:p>
+            <a:pPr fontAlgn="base"/>
+            <a:endParaRPr lang="en-US" sz="3200" dirty="0">
+              <a:solidFill>
+                <a:schemeClr val="dk1"/>
+              </a:solidFill>
+              <a:latin typeface="Arial" panose="020B0604020202020204" pitchFamily="34" charset="0"/>
+              <a:ea typeface="Helvetica Neue"/>
+              <a:cs typeface="Arial" panose="020B0604020202020204" pitchFamily="34" charset="0"/>
+              <a:sym typeface="Helvetica Neue"/>
+            </a:endParaRPr>
+          </a:p>
+          <a:p>
+            <a:pPr fontAlgn="base"/>
+            <a:endParaRPr lang="en-US" sz="3200" dirty="0">
+              <a:solidFill>
+                <a:schemeClr val="dk1"/>
+              </a:solidFill>
+              <a:latin typeface="Arial" panose="020B0604020202020204" pitchFamily="34" charset="0"/>
+              <a:ea typeface="Helvetica Neue"/>
+              <a:cs typeface="Arial" panose="020B0604020202020204" pitchFamily="34" charset="0"/>
+              <a:sym typeface="Helvetica Neue"/>
+            </a:endParaRPr>
+          </a:p>
+          <a:p>
+            <a:pPr fontAlgn="base"/>
+            <a:endParaRPr lang="en-US" sz="3200" dirty="0">
+              <a:solidFill>
+                <a:schemeClr val="dk1"/>
+              </a:solidFill>
+              <a:latin typeface="Arial" panose="020B0604020202020204" pitchFamily="34" charset="0"/>
+              <a:ea typeface="Helvetica Neue"/>
+              <a:cs typeface="Arial" panose="020B0604020202020204" pitchFamily="34" charset="0"/>
+              <a:sym typeface="Helvetica Neue"/>
+            </a:endParaRPr>
+          </a:p>
+          <a:p>
+            <a:pPr fontAlgn="base"/>
+            <a:endParaRPr lang="en-US" sz="3200" dirty="0">
+              <a:solidFill>
+                <a:schemeClr val="dk1"/>
+              </a:solidFill>
+              <a:latin typeface="Arial" panose="020B0604020202020204" pitchFamily="34" charset="0"/>
+              <a:ea typeface="Helvetica Neue"/>
+              <a:cs typeface="Arial" panose="020B0604020202020204" pitchFamily="34" charset="0"/>
+              <a:sym typeface="Helvetica Neue"/>
+            </a:endParaRPr>
+          </a:p>
+          <a:p>
+            <a:pPr fontAlgn="base"/>
+            <a:endParaRPr lang="en-US" sz="3200" dirty="0">
+              <a:solidFill>
+                <a:schemeClr val="dk1"/>
+              </a:solidFill>
+              <a:latin typeface="Arial" panose="020B0604020202020204" pitchFamily="34" charset="0"/>
+              <a:ea typeface="Helvetica Neue"/>
+              <a:cs typeface="Arial" panose="020B0604020202020204" pitchFamily="34" charset="0"/>
+              <a:sym typeface="Helvetica Neue"/>
+            </a:endParaRPr>
+          </a:p>
+          <a:p>
+            <a:pPr fontAlgn="base"/>
+            <a:endParaRPr lang="en-US" sz="3200" dirty="0">
+              <a:solidFill>
+                <a:schemeClr val="dk1"/>
               </a:solidFill>
               <a:latin typeface="Arial" panose="020B0604020202020204" pitchFamily="34" charset="0"/>
               <a:ea typeface="Helvetica Neue"/>
@@ -9889,180 +10054,84 @@
               <a:buFont typeface="Arial" panose="020B0604020202020204" pitchFamily="34" charset="0"/>
               <a:buChar char="•"/>
             </a:pPr>
-            <a:endParaRPr lang="en-US" sz="3200" kern="1200" dirty="0">
-              <a:solidFill>
-                <a:schemeClr val="tx1"/>
-              </a:solidFill>
-              <a:latin typeface="Arial" panose="020B0604020202020204" pitchFamily="34" charset="0"/>
-              <a:ea typeface="Helvetica Neue"/>
-              <a:cs typeface="Arial" panose="020B0604020202020204" pitchFamily="34" charset="0"/>
-              <a:sym typeface="Helvetica Neue"/>
-            </a:endParaRPr>
+            <a:r>
+              <a:rPr lang="en-US" sz="3200" dirty="0">
+                <a:solidFill>
+                  <a:schemeClr val="dk1"/>
+                </a:solidFill>
+                <a:latin typeface="Arial" panose="020B0604020202020204" pitchFamily="34" charset="0"/>
+                <a:ea typeface="Helvetica Neue"/>
+                <a:cs typeface="Arial" panose="020B0604020202020204" pitchFamily="34" charset="0"/>
+                <a:sym typeface="Helvetica Neue"/>
+              </a:rPr>
+              <a:t>288 participants (141F) recruited through Prolific from another previous experiment in our lab completed the study on Qualtrics</a:t>
+            </a:r>
           </a:p>
           <a:p>
             <a:pPr marL="457200" indent="-457200" fontAlgn="base">
               <a:buFont typeface="Arial" panose="020B0604020202020204" pitchFamily="34" charset="0"/>
               <a:buChar char="•"/>
             </a:pPr>
-            <a:endParaRPr lang="en-US" sz="3200" kern="1200" dirty="0">
-              <a:solidFill>
-                <a:schemeClr val="tx1"/>
-              </a:solidFill>
-              <a:latin typeface="Arial" panose="020B0604020202020204" pitchFamily="34" charset="0"/>
-              <a:ea typeface="Helvetica Neue"/>
-              <a:cs typeface="Arial" panose="020B0604020202020204" pitchFamily="34" charset="0"/>
-              <a:sym typeface="Helvetica Neue"/>
-            </a:endParaRPr>
+            <a:r>
+              <a:rPr lang="en-US" sz="3200" dirty="0">
+                <a:solidFill>
+                  <a:schemeClr val="dk1"/>
+                </a:solidFill>
+                <a:latin typeface="Arial" panose="020B0604020202020204" pitchFamily="34" charset="0"/>
+                <a:ea typeface="Helvetica Neue"/>
+                <a:cs typeface="Arial" panose="020B0604020202020204" pitchFamily="34" charset="0"/>
+                <a:sym typeface="Helvetica Neue"/>
+              </a:rPr>
+              <a:t>Survey included Questionnaire of Unpredictability in Childhood (QUIC; cite), the full Confusion, Hubbub, and Order Scale (CHAOS; cite), McLaughlin Deprivation &amp; Threat Scales (cite), the State/Trait Anxiety Inventory (STAI; cite), the Connor-Davidson Resilience Scale (CD-RISC-10; cite), the </a:t>
+            </a:r>
+            <a:r>
+              <a:rPr lang="en-US" sz="3200" dirty="0" err="1">
+                <a:solidFill>
+                  <a:schemeClr val="dk1"/>
+                </a:solidFill>
+                <a:latin typeface="Arial" panose="020B0604020202020204" pitchFamily="34" charset="0"/>
+                <a:ea typeface="Helvetica Neue"/>
+                <a:cs typeface="Arial" panose="020B0604020202020204" pitchFamily="34" charset="0"/>
+                <a:sym typeface="Helvetica Neue"/>
+              </a:rPr>
+              <a:t>Escapsim</a:t>
+            </a:r>
+            <a:r>
+              <a:rPr lang="en-US" sz="3200" dirty="0">
+                <a:solidFill>
+                  <a:schemeClr val="dk1"/>
+                </a:solidFill>
+                <a:latin typeface="Arial" panose="020B0604020202020204" pitchFamily="34" charset="0"/>
+                <a:ea typeface="Helvetica Neue"/>
+                <a:cs typeface="Arial" panose="020B0604020202020204" pitchFamily="34" charset="0"/>
+                <a:sym typeface="Helvetica Neue"/>
+              </a:rPr>
+              <a:t> Scale (cite) adapted for music, and the Absorption in Music Scale (cite)</a:t>
+            </a:r>
           </a:p>
           <a:p>
             <a:pPr marL="457200" indent="-457200" fontAlgn="base">
               <a:buFont typeface="Arial" panose="020B0604020202020204" pitchFamily="34" charset="0"/>
               <a:buChar char="•"/>
             </a:pPr>
-            <a:endParaRPr lang="en-US" sz="3200" kern="1200" dirty="0">
-              <a:solidFill>
-                <a:schemeClr val="tx1"/>
-              </a:solidFill>
-              <a:latin typeface="Arial" panose="020B0604020202020204" pitchFamily="34" charset="0"/>
-              <a:ea typeface="Helvetica Neue"/>
-              <a:cs typeface="Arial" panose="020B0604020202020204" pitchFamily="34" charset="0"/>
-              <a:sym typeface="Helvetica Neue"/>
-            </a:endParaRPr>
-          </a:p>
-          <a:p>
-            <a:pPr fontAlgn="base"/>
-            <a:endParaRPr lang="en-US" sz="3200" dirty="0">
-              <a:solidFill>
-                <a:schemeClr val="dk1"/>
-              </a:solidFill>
-              <a:latin typeface="Arial" panose="020B0604020202020204" pitchFamily="34" charset="0"/>
-              <a:ea typeface="Helvetica Neue"/>
-              <a:cs typeface="Arial" panose="020B0604020202020204" pitchFamily="34" charset="0"/>
-              <a:sym typeface="Helvetica Neue"/>
-            </a:endParaRPr>
-          </a:p>
-          <a:p>
-            <a:pPr fontAlgn="base"/>
-            <a:endParaRPr lang="en-US" sz="3200" dirty="0">
-              <a:solidFill>
-                <a:schemeClr val="dk1"/>
-              </a:solidFill>
-              <a:latin typeface="Arial" panose="020B0604020202020204" pitchFamily="34" charset="0"/>
-              <a:ea typeface="Helvetica Neue"/>
-              <a:cs typeface="Arial" panose="020B0604020202020204" pitchFamily="34" charset="0"/>
-              <a:sym typeface="Helvetica Neue"/>
-            </a:endParaRPr>
-          </a:p>
-          <a:p>
-            <a:pPr fontAlgn="base"/>
-            <a:endParaRPr lang="en-US" sz="3200" dirty="0">
-              <a:solidFill>
-                <a:schemeClr val="dk1"/>
-              </a:solidFill>
-              <a:latin typeface="Arial" panose="020B0604020202020204" pitchFamily="34" charset="0"/>
-              <a:ea typeface="Helvetica Neue"/>
-              <a:cs typeface="Arial" panose="020B0604020202020204" pitchFamily="34" charset="0"/>
-              <a:sym typeface="Helvetica Neue"/>
-            </a:endParaRPr>
-          </a:p>
-          <a:p>
-            <a:pPr fontAlgn="base"/>
-            <a:endParaRPr lang="en-US" sz="3200" dirty="0">
-              <a:solidFill>
-                <a:schemeClr val="dk1"/>
-              </a:solidFill>
-              <a:latin typeface="Arial" panose="020B0604020202020204" pitchFamily="34" charset="0"/>
-              <a:ea typeface="Helvetica Neue"/>
-              <a:cs typeface="Arial" panose="020B0604020202020204" pitchFamily="34" charset="0"/>
-              <a:sym typeface="Helvetica Neue"/>
-            </a:endParaRPr>
-          </a:p>
-          <a:p>
-            <a:pPr fontAlgn="base"/>
-            <a:endParaRPr lang="en-US" sz="3200" dirty="0">
-              <a:solidFill>
-                <a:schemeClr val="dk1"/>
-              </a:solidFill>
-              <a:latin typeface="Arial" panose="020B0604020202020204" pitchFamily="34" charset="0"/>
-              <a:ea typeface="Helvetica Neue"/>
-              <a:cs typeface="Arial" panose="020B0604020202020204" pitchFamily="34" charset="0"/>
-              <a:sym typeface="Helvetica Neue"/>
-            </a:endParaRPr>
+            <a:r>
+              <a:rPr lang="en-US" sz="3200" dirty="0">
+                <a:solidFill>
+                  <a:schemeClr val="dk1"/>
+                </a:solidFill>
+                <a:latin typeface="Arial" panose="020B0604020202020204" pitchFamily="34" charset="0"/>
+                <a:ea typeface="Helvetica Neue"/>
+                <a:cs typeface="Arial" panose="020B0604020202020204" pitchFamily="34" charset="0"/>
+                <a:sym typeface="Helvetica Neue"/>
+              </a:rPr>
+              <a:t>Participants also completed the Barcelona Music Reward Questionnaire (BMRQ; cite) and the Revised Physical Anhedonia Scale (PAS, cite) in the previous study</a:t>
+            </a:r>
           </a:p>
           <a:p>
             <a:pPr marL="457200" indent="-457200" fontAlgn="base">
               <a:buFont typeface="Arial" panose="020B0604020202020204" pitchFamily="34" charset="0"/>
               <a:buChar char="•"/>
             </a:pPr>
-            <a:endParaRPr lang="en-US" sz="3200" dirty="0">
-              <a:solidFill>
-                <a:schemeClr val="dk1"/>
-              </a:solidFill>
-              <a:latin typeface="Arial" panose="020B0604020202020204" pitchFamily="34" charset="0"/>
-              <a:ea typeface="Helvetica Neue"/>
-              <a:cs typeface="Arial" panose="020B0604020202020204" pitchFamily="34" charset="0"/>
-              <a:sym typeface="Helvetica Neue"/>
-            </a:endParaRPr>
-          </a:p>
-          <a:p>
-            <a:pPr marL="457200" indent="-457200" fontAlgn="base">
-              <a:buFont typeface="Arial" panose="020B0604020202020204" pitchFamily="34" charset="0"/>
-              <a:buChar char="•"/>
-            </a:pPr>
-            <a:endParaRPr lang="en-US" sz="3200" dirty="0">
-              <a:solidFill>
-                <a:schemeClr val="dk1"/>
-              </a:solidFill>
-              <a:latin typeface="Arial" panose="020B0604020202020204" pitchFamily="34" charset="0"/>
-              <a:ea typeface="Helvetica Neue"/>
-              <a:cs typeface="Arial" panose="020B0604020202020204" pitchFamily="34" charset="0"/>
-              <a:sym typeface="Helvetica Neue"/>
-            </a:endParaRPr>
-          </a:p>
-          <a:p>
-            <a:pPr fontAlgn="base"/>
-            <a:endParaRPr lang="en-US" sz="3200" dirty="0">
-              <a:solidFill>
-                <a:schemeClr val="dk1"/>
-              </a:solidFill>
-              <a:latin typeface="Arial" panose="020B0604020202020204" pitchFamily="34" charset="0"/>
-              <a:ea typeface="Helvetica Neue"/>
-              <a:cs typeface="Arial" panose="020B0604020202020204" pitchFamily="34" charset="0"/>
-              <a:sym typeface="Helvetica Neue"/>
-            </a:endParaRPr>
-          </a:p>
-          <a:p>
-            <a:pPr marL="457200" indent="-457200" fontAlgn="base">
-              <a:buFont typeface="Arial" panose="020B0604020202020204" pitchFamily="34" charset="0"/>
-              <a:buChar char="•"/>
-            </a:pPr>
-            <a:endParaRPr lang="en-US" sz="3200" dirty="0">
-              <a:solidFill>
-                <a:schemeClr val="dk1"/>
-              </a:solidFill>
-              <a:latin typeface="Arial" panose="020B0604020202020204" pitchFamily="34" charset="0"/>
-              <a:ea typeface="Helvetica Neue"/>
-              <a:cs typeface="Arial" panose="020B0604020202020204" pitchFamily="34" charset="0"/>
-              <a:sym typeface="Helvetica Neue"/>
-            </a:endParaRPr>
-          </a:p>
-          <a:p>
-            <a:pPr marL="457200" indent="-457200" fontAlgn="base">
-              <a:buFont typeface="Arial" panose="020B0604020202020204" pitchFamily="34" charset="0"/>
-              <a:buChar char="•"/>
-            </a:pPr>
-            <a:endParaRPr lang="en-US" sz="3200" dirty="0">
-              <a:solidFill>
-                <a:schemeClr val="dk1"/>
-              </a:solidFill>
-              <a:latin typeface="Arial" panose="020B0604020202020204" pitchFamily="34" charset="0"/>
-              <a:ea typeface="Helvetica Neue"/>
-              <a:cs typeface="Arial" panose="020B0604020202020204" pitchFamily="34" charset="0"/>
-              <a:sym typeface="Helvetica Neue"/>
-            </a:endParaRPr>
-          </a:p>
-          <a:p>
-            <a:pPr fontAlgn="base"/>
             <a:endParaRPr lang="en-US" sz="3200" dirty="0">
               <a:solidFill>
                 <a:schemeClr val="dk1"/>
@@ -10090,7 +10159,7 @@
         </p:blipFill>
         <p:spPr>
           <a:xfrm>
-            <a:off x="1180578" y="1177446"/>
+            <a:off x="2837767" y="1109706"/>
             <a:ext cx="3314379" cy="3072487"/>
           </a:xfrm>
           <a:prstGeom prst="rect">
@@ -10448,7 +10517,307 @@
                 <a:cs typeface="Arial" panose="020B0604020202020204" pitchFamily="34" charset="0"/>
                 <a:sym typeface="Helvetica Neue"/>
               </a:rPr>
-              <a:t>connection</a:t>
+              <a:t>Connection</a:t>
+            </a:r>
+          </a:p>
+          <a:p>
+            <a:pPr fontAlgn="base"/>
+            <a:endParaRPr lang="en-US" sz="3200" dirty="0">
+              <a:solidFill>
+                <a:schemeClr val="dk1"/>
+              </a:solidFill>
+              <a:latin typeface="Arial" panose="020B0604020202020204" pitchFamily="34" charset="0"/>
+              <a:ea typeface="Helvetica Neue"/>
+              <a:cs typeface="Arial" panose="020B0604020202020204" pitchFamily="34" charset="0"/>
+              <a:sym typeface="Helvetica Neue"/>
+            </a:endParaRPr>
+          </a:p>
+          <a:p>
+            <a:pPr fontAlgn="base"/>
+            <a:endParaRPr lang="en-US" sz="3200" dirty="0">
+              <a:solidFill>
+                <a:schemeClr val="dk1"/>
+              </a:solidFill>
+              <a:latin typeface="Arial" panose="020B0604020202020204" pitchFamily="34" charset="0"/>
+              <a:ea typeface="Helvetica Neue"/>
+              <a:cs typeface="Arial" panose="020B0604020202020204" pitchFamily="34" charset="0"/>
+              <a:sym typeface="Helvetica Neue"/>
+            </a:endParaRPr>
+          </a:p>
+          <a:p>
+            <a:pPr fontAlgn="base"/>
+            <a:endParaRPr lang="en-US" sz="3200" dirty="0">
+              <a:solidFill>
+                <a:schemeClr val="dk1"/>
+              </a:solidFill>
+              <a:latin typeface="Arial" panose="020B0604020202020204" pitchFamily="34" charset="0"/>
+              <a:ea typeface="Helvetica Neue"/>
+              <a:cs typeface="Arial" panose="020B0604020202020204" pitchFamily="34" charset="0"/>
+              <a:sym typeface="Helvetica Neue"/>
+            </a:endParaRPr>
+          </a:p>
+          <a:p>
+            <a:pPr fontAlgn="base"/>
+            <a:endParaRPr lang="en-US" sz="3200" dirty="0">
+              <a:solidFill>
+                <a:schemeClr val="dk1"/>
+              </a:solidFill>
+              <a:latin typeface="Arial" panose="020B0604020202020204" pitchFamily="34" charset="0"/>
+              <a:ea typeface="Helvetica Neue"/>
+              <a:cs typeface="Arial" panose="020B0604020202020204" pitchFamily="34" charset="0"/>
+              <a:sym typeface="Helvetica Neue"/>
+            </a:endParaRPr>
+          </a:p>
+          <a:p>
+            <a:pPr fontAlgn="base"/>
+            <a:endParaRPr lang="en-US" sz="3200" dirty="0">
+              <a:solidFill>
+                <a:schemeClr val="dk1"/>
+              </a:solidFill>
+              <a:latin typeface="Arial" panose="020B0604020202020204" pitchFamily="34" charset="0"/>
+              <a:ea typeface="Helvetica Neue"/>
+              <a:cs typeface="Arial" panose="020B0604020202020204" pitchFamily="34" charset="0"/>
+              <a:sym typeface="Helvetica Neue"/>
+            </a:endParaRPr>
+          </a:p>
+          <a:p>
+            <a:pPr fontAlgn="base"/>
+            <a:endParaRPr lang="en-US" sz="3200" dirty="0">
+              <a:solidFill>
+                <a:schemeClr val="dk1"/>
+              </a:solidFill>
+              <a:latin typeface="Arial" panose="020B0604020202020204" pitchFamily="34" charset="0"/>
+              <a:ea typeface="Helvetica Neue"/>
+              <a:cs typeface="Arial" panose="020B0604020202020204" pitchFamily="34" charset="0"/>
+              <a:sym typeface="Helvetica Neue"/>
+            </a:endParaRPr>
+          </a:p>
+          <a:p>
+            <a:pPr fontAlgn="base"/>
+            <a:endParaRPr lang="en-US" sz="3200" dirty="0">
+              <a:solidFill>
+                <a:schemeClr val="dk1"/>
+              </a:solidFill>
+              <a:latin typeface="Arial" panose="020B0604020202020204" pitchFamily="34" charset="0"/>
+              <a:ea typeface="Helvetica Neue"/>
+              <a:cs typeface="Arial" panose="020B0604020202020204" pitchFamily="34" charset="0"/>
+              <a:sym typeface="Helvetica Neue"/>
+            </a:endParaRPr>
+          </a:p>
+          <a:p>
+            <a:pPr fontAlgn="base"/>
+            <a:endParaRPr lang="en-US" sz="3200" dirty="0">
+              <a:solidFill>
+                <a:schemeClr val="dk1"/>
+              </a:solidFill>
+              <a:latin typeface="Arial" panose="020B0604020202020204" pitchFamily="34" charset="0"/>
+              <a:ea typeface="Helvetica Neue"/>
+              <a:cs typeface="Arial" panose="020B0604020202020204" pitchFamily="34" charset="0"/>
+              <a:sym typeface="Helvetica Neue"/>
+            </a:endParaRPr>
+          </a:p>
+          <a:p>
+            <a:pPr fontAlgn="base"/>
+            <a:endParaRPr lang="en-US" sz="3200" dirty="0">
+              <a:solidFill>
+                <a:schemeClr val="dk1"/>
+              </a:solidFill>
+              <a:latin typeface="Arial" panose="020B0604020202020204" pitchFamily="34" charset="0"/>
+              <a:ea typeface="Helvetica Neue"/>
+              <a:cs typeface="Arial" panose="020B0604020202020204" pitchFamily="34" charset="0"/>
+              <a:sym typeface="Helvetica Neue"/>
+            </a:endParaRPr>
+          </a:p>
+          <a:p>
+            <a:pPr fontAlgn="base"/>
+            <a:endParaRPr lang="en-US" sz="3200" dirty="0">
+              <a:solidFill>
+                <a:schemeClr val="dk1"/>
+              </a:solidFill>
+              <a:latin typeface="Arial" panose="020B0604020202020204" pitchFamily="34" charset="0"/>
+              <a:ea typeface="Helvetica Neue"/>
+              <a:cs typeface="Arial" panose="020B0604020202020204" pitchFamily="34" charset="0"/>
+              <a:sym typeface="Helvetica Neue"/>
+            </a:endParaRPr>
+          </a:p>
+          <a:p>
+            <a:pPr fontAlgn="base"/>
+            <a:endParaRPr lang="en-US" sz="3200" dirty="0">
+              <a:solidFill>
+                <a:schemeClr val="dk1"/>
+              </a:solidFill>
+              <a:latin typeface="Arial" panose="020B0604020202020204" pitchFamily="34" charset="0"/>
+              <a:ea typeface="Helvetica Neue"/>
+              <a:cs typeface="Arial" panose="020B0604020202020204" pitchFamily="34" charset="0"/>
+              <a:sym typeface="Helvetica Neue"/>
+            </a:endParaRPr>
+          </a:p>
+          <a:p>
+            <a:pPr fontAlgn="base"/>
+            <a:endParaRPr lang="en-US" sz="3200" dirty="0">
+              <a:solidFill>
+                <a:schemeClr val="dk1"/>
+              </a:solidFill>
+              <a:latin typeface="Arial" panose="020B0604020202020204" pitchFamily="34" charset="0"/>
+              <a:ea typeface="Helvetica Neue"/>
+              <a:cs typeface="Arial" panose="020B0604020202020204" pitchFamily="34" charset="0"/>
+              <a:sym typeface="Helvetica Neue"/>
+            </a:endParaRPr>
+          </a:p>
+          <a:p>
+            <a:pPr fontAlgn="base"/>
+            <a:endParaRPr lang="en-US" sz="3200" dirty="0">
+              <a:solidFill>
+                <a:schemeClr val="dk1"/>
+              </a:solidFill>
+              <a:latin typeface="Arial" panose="020B0604020202020204" pitchFamily="34" charset="0"/>
+              <a:ea typeface="Helvetica Neue"/>
+              <a:cs typeface="Arial" panose="020B0604020202020204" pitchFamily="34" charset="0"/>
+              <a:sym typeface="Helvetica Neue"/>
+            </a:endParaRPr>
+          </a:p>
+          <a:p>
+            <a:pPr fontAlgn="base"/>
+            <a:endParaRPr lang="en-US" sz="3200" dirty="0">
+              <a:solidFill>
+                <a:schemeClr val="dk1"/>
+              </a:solidFill>
+              <a:latin typeface="Arial" panose="020B0604020202020204" pitchFamily="34" charset="0"/>
+              <a:ea typeface="Helvetica Neue"/>
+              <a:cs typeface="Arial" panose="020B0604020202020204" pitchFamily="34" charset="0"/>
+              <a:sym typeface="Helvetica Neue"/>
+            </a:endParaRPr>
+          </a:p>
+          <a:p>
+            <a:pPr fontAlgn="base"/>
+            <a:endParaRPr lang="en-US" sz="3200" dirty="0">
+              <a:solidFill>
+                <a:schemeClr val="dk1"/>
+              </a:solidFill>
+              <a:latin typeface="Arial" panose="020B0604020202020204" pitchFamily="34" charset="0"/>
+              <a:ea typeface="Helvetica Neue"/>
+              <a:cs typeface="Arial" panose="020B0604020202020204" pitchFamily="34" charset="0"/>
+              <a:sym typeface="Helvetica Neue"/>
+            </a:endParaRPr>
+          </a:p>
+          <a:p>
+            <a:pPr fontAlgn="base"/>
+            <a:endParaRPr lang="en-US" sz="3200" dirty="0">
+              <a:solidFill>
+                <a:schemeClr val="dk1"/>
+              </a:solidFill>
+              <a:latin typeface="Arial" panose="020B0604020202020204" pitchFamily="34" charset="0"/>
+              <a:ea typeface="Helvetica Neue"/>
+              <a:cs typeface="Arial" panose="020B0604020202020204" pitchFamily="34" charset="0"/>
+              <a:sym typeface="Helvetica Neue"/>
+            </a:endParaRPr>
+          </a:p>
+          <a:p>
+            <a:pPr fontAlgn="base"/>
+            <a:endParaRPr lang="en-US" sz="3200" dirty="0">
+              <a:solidFill>
+                <a:schemeClr val="dk1"/>
+              </a:solidFill>
+              <a:latin typeface="Arial" panose="020B0604020202020204" pitchFamily="34" charset="0"/>
+              <a:ea typeface="Helvetica Neue"/>
+              <a:cs typeface="Arial" panose="020B0604020202020204" pitchFamily="34" charset="0"/>
+              <a:sym typeface="Helvetica Neue"/>
+            </a:endParaRPr>
+          </a:p>
+          <a:p>
+            <a:pPr marL="457200" indent="-457200" fontAlgn="base">
+              <a:buFont typeface="Arial" panose="020B0604020202020204" pitchFamily="34" charset="0"/>
+              <a:buChar char="•"/>
+            </a:pPr>
+            <a:r>
+              <a:rPr lang="en-US" sz="3200" dirty="0">
+                <a:solidFill>
+                  <a:schemeClr val="dk1"/>
+                </a:solidFill>
+                <a:latin typeface="Arial" panose="020B0604020202020204" pitchFamily="34" charset="0"/>
+                <a:ea typeface="Helvetica Neue"/>
+                <a:cs typeface="Arial" panose="020B0604020202020204" pitchFamily="34" charset="0"/>
+                <a:sym typeface="Helvetica Neue"/>
+              </a:rPr>
+              <a:t>254 participants (140F) recruited through Prolific from a previous experiment in our lab completed the study on Qualtrics</a:t>
+            </a:r>
+          </a:p>
+          <a:p>
+            <a:pPr marL="457200" indent="-457200" fontAlgn="base">
+              <a:buFont typeface="Arial" panose="020B0604020202020204" pitchFamily="34" charset="0"/>
+              <a:buChar char="•"/>
+            </a:pPr>
+            <a:r>
+              <a:rPr lang="en-US" sz="3200" dirty="0">
+                <a:solidFill>
+                  <a:schemeClr val="dk1"/>
+                </a:solidFill>
+                <a:latin typeface="Arial" panose="020B0604020202020204" pitchFamily="34" charset="0"/>
+                <a:ea typeface="Helvetica Neue"/>
+                <a:cs typeface="Arial" panose="020B0604020202020204" pitchFamily="34" charset="0"/>
+                <a:sym typeface="Helvetica Neue"/>
+              </a:rPr>
+              <a:t>Survey included Questionnaire of Unpredictability in Childhood (QUIC; cite), the short-form Confusion, Hubbub, and Order Scale (CHAOS; cite), McLaughlin Deprivation &amp; Threat Scales (cite), Healthy-Unhealthy Music Scale (HUMS; cite), the State/Trait Anxiety Inventory (STAI; cite), the Connor-Davidson Resilience Scale (CD-RISC-10; cite)</a:t>
+            </a:r>
+          </a:p>
+          <a:p>
+            <a:pPr marL="457200" indent="-457200" fontAlgn="base">
+              <a:buFont typeface="Arial" panose="020B0604020202020204" pitchFamily="34" charset="0"/>
+              <a:buChar char="•"/>
+            </a:pPr>
+            <a:r>
+              <a:rPr lang="en-US" sz="3200" dirty="0">
+                <a:solidFill>
+                  <a:schemeClr val="dk1"/>
+                </a:solidFill>
+                <a:latin typeface="Arial" panose="020B0604020202020204" pitchFamily="34" charset="0"/>
+                <a:ea typeface="Helvetica Neue"/>
+                <a:cs typeface="Arial" panose="020B0604020202020204" pitchFamily="34" charset="0"/>
+                <a:sym typeface="Helvetica Neue"/>
+              </a:rPr>
+              <a:t>All retrospective adversity measures were reported for both childhood (6-12) and adolescence (13-18)</a:t>
+            </a:r>
+          </a:p>
+          <a:p>
+            <a:pPr marL="457200" indent="-457200" fontAlgn="base">
+              <a:buFont typeface="Arial" panose="020B0604020202020204" pitchFamily="34" charset="0"/>
+              <a:buChar char="•"/>
+            </a:pPr>
+            <a:r>
+              <a:rPr lang="en-US" sz="3200" dirty="0">
+                <a:solidFill>
+                  <a:schemeClr val="dk1"/>
+                </a:solidFill>
+                <a:latin typeface="Arial" panose="020B0604020202020204" pitchFamily="34" charset="0"/>
+                <a:ea typeface="Helvetica Neue"/>
+                <a:cs typeface="Arial" panose="020B0604020202020204" pitchFamily="34" charset="0"/>
+                <a:sym typeface="Helvetica Neue"/>
+              </a:rPr>
+              <a:t>Participants also completed the Extended Barcelona Music Reward Questionnaire (</a:t>
+            </a:r>
+            <a:r>
+              <a:rPr lang="en-US" sz="3200" dirty="0" err="1">
+                <a:solidFill>
+                  <a:schemeClr val="dk1"/>
+                </a:solidFill>
+                <a:latin typeface="Arial" panose="020B0604020202020204" pitchFamily="34" charset="0"/>
+                <a:ea typeface="Helvetica Neue"/>
+                <a:cs typeface="Arial" panose="020B0604020202020204" pitchFamily="34" charset="0"/>
+                <a:sym typeface="Helvetica Neue"/>
+              </a:rPr>
+              <a:t>eBMRQ</a:t>
+            </a:r>
+            <a:r>
+              <a:rPr lang="en-US" sz="3200" dirty="0">
+                <a:solidFill>
+                  <a:schemeClr val="dk1"/>
+                </a:solidFill>
+                <a:latin typeface="Arial" panose="020B0604020202020204" pitchFamily="34" charset="0"/>
+                <a:ea typeface="Helvetica Neue"/>
+                <a:cs typeface="Arial" panose="020B0604020202020204" pitchFamily="34" charset="0"/>
+                <a:sym typeface="Helvetica Neue"/>
+              </a:rPr>
+              <a:t>; cite) and the Revised Physical Anhedonia Scale (PAS, cite) in the previous study</a:t>
             </a:r>
           </a:p>
         </p:txBody>
@@ -10511,7 +10880,7 @@
                 <a:cs typeface="Arial" panose="020B0604020202020204" pitchFamily="34" charset="0"/>
                 <a:sym typeface="Helvetica Neue"/>
               </a:rPr>
-              <a:t>AIMS mediates the relationship between ELA and resilience</a:t>
+              <a:t>AIMS mediates the relationship between CHAOS scores and resilience</a:t>
             </a:r>
             <a:endParaRPr lang="en-US" sz="5200" dirty="0">
               <a:latin typeface="Arial" panose="020B0604020202020204" pitchFamily="34" charset="0"/>
@@ -10534,7 +10903,7 @@
         </p:nvSpPr>
         <p:spPr>
           <a:xfrm>
-            <a:off x="615199" y="20346843"/>
+            <a:off x="616765" y="17113420"/>
             <a:ext cx="13877365" cy="1289304"/>
           </a:xfrm>
           <a:prstGeom prst="rect">
@@ -10807,36 +11176,6 @@
           </a:p>
         </p:txBody>
       </p:sp>
-      <p:pic>
-        <p:nvPicPr>
-          <p:cNvPr id="60" name="Picture 59">
-            <a:extLst>
-              <a:ext uri="{FF2B5EF4-FFF2-40B4-BE49-F238E27FC236}">
-                <a16:creationId xmlns:a16="http://schemas.microsoft.com/office/drawing/2014/main" id="{F2967E42-D2B4-FF4B-903D-2BAD6084EA8C}"/>
-              </a:ext>
-            </a:extLst>
-          </p:cNvPr>
-          <p:cNvPicPr>
-            <a:picLocks noChangeAspect="1"/>
-          </p:cNvPicPr>
-          <p:nvPr/>
-        </p:nvPicPr>
-        <p:blipFill>
-          <a:blip r:embed="rId7"/>
-          <a:stretch>
-            <a:fillRect/>
-          </a:stretch>
-        </p:blipFill>
-        <p:spPr>
-          <a:xfrm>
-            <a:off x="39075199" y="37815609"/>
-            <a:ext cx="642088" cy="642088"/>
-          </a:xfrm>
-          <a:prstGeom prst="rect">
-            <a:avLst/>
-          </a:prstGeom>
-        </p:spPr>
-      </p:pic>
       <p:sp>
         <p:nvSpPr>
           <p:cNvPr id="61" name="TextBox 60">
@@ -10995,7 +11334,7 @@
                 <a:cs typeface="Arial" panose="020B0604020202020204" pitchFamily="34" charset="0"/>
                 <a:sym typeface="Helvetica Neue"/>
               </a:rPr>
-              <a:t>Absorption in music significantly related to positive and negative escapism (and ELA)</a:t>
+              <a:t>Absorption in music significantly related to positive and negative escapism (or just escapism?)</a:t>
             </a:r>
             <a:endParaRPr lang="en-US" sz="5200" dirty="0">
               <a:latin typeface="Arial" panose="020B0604020202020204" pitchFamily="34" charset="0"/>
@@ -11019,7 +11358,7 @@
           <p:nvPr/>
         </p:nvPicPr>
         <p:blipFill>
-          <a:blip r:embed="rId8">
+          <a:blip r:embed="rId7">
             <a:extLst>
               <a:ext uri="{28A0092B-C50C-407E-A947-70E740481C1C}">
                 <a14:useLocalDpi xmlns:a14="http://schemas.microsoft.com/office/drawing/2010/main" val="0"/>
@@ -11053,36 +11392,6 @@
       </p:pic>
       <p:pic>
         <p:nvPicPr>
-          <p:cNvPr id="32" name="Picture 31" descr="Qr code&#10;&#10;Description automatically generated">
-            <a:extLst>
-              <a:ext uri="{FF2B5EF4-FFF2-40B4-BE49-F238E27FC236}">
-                <a16:creationId xmlns:a16="http://schemas.microsoft.com/office/drawing/2014/main" id="{EAAF230A-933D-E543-33D0-AA6499BA5724}"/>
-              </a:ext>
-            </a:extLst>
-          </p:cNvPr>
-          <p:cNvPicPr>
-            <a:picLocks noChangeAspect="1"/>
-          </p:cNvPicPr>
-          <p:nvPr/>
-        </p:nvPicPr>
-        <p:blipFill>
-          <a:blip r:embed="rId9"/>
-          <a:stretch>
-            <a:fillRect/>
-          </a:stretch>
-        </p:blipFill>
-        <p:spPr>
-          <a:xfrm>
-            <a:off x="43083031" y="37751681"/>
-            <a:ext cx="653118" cy="653118"/>
-          </a:xfrm>
-          <a:prstGeom prst="rect">
-            <a:avLst/>
-          </a:prstGeom>
-        </p:spPr>
-      </p:pic>
-      <p:pic>
-        <p:nvPicPr>
           <p:cNvPr id="5" name="Picture 4" descr="A picture containing text, graphics, graphic design, clipart&#10;&#10;Description automatically generated">
             <a:extLst>
               <a:ext uri="{FF2B5EF4-FFF2-40B4-BE49-F238E27FC236}">
@@ -11096,7 +11405,7 @@
           <p:nvPr/>
         </p:nvPicPr>
         <p:blipFill>
-          <a:blip r:embed="rId10"/>
+          <a:blip r:embed="rId8"/>
           <a:stretch>
             <a:fillRect/>
           </a:stretch>
@@ -11195,7 +11504,7 @@
         </p:nvSpPr>
         <p:spPr>
           <a:xfrm>
-            <a:off x="14688964" y="15759174"/>
+            <a:off x="14688964" y="15616043"/>
             <a:ext cx="13880592" cy="1287418"/>
           </a:xfrm>
           <a:prstGeom prst="rect">
@@ -11263,7 +11572,7 @@
           <p:nvPr/>
         </p:nvPicPr>
         <p:blipFill>
-          <a:blip r:embed="rId11"/>
+          <a:blip r:embed="rId9"/>
           <a:stretch>
             <a:fillRect/>
           </a:stretch>
@@ -11293,7 +11602,7 @@
           <p:nvPr/>
         </p:nvPicPr>
         <p:blipFill>
-          <a:blip r:embed="rId12"/>
+          <a:blip r:embed="rId10"/>
           <a:stretch>
             <a:fillRect/>
           </a:stretch>
@@ -11323,7 +11632,7 @@
           <p:nvPr/>
         </p:nvPicPr>
         <p:blipFill>
-          <a:blip r:embed="rId13"/>
+          <a:blip r:embed="rId11"/>
           <a:stretch>
             <a:fillRect/>
           </a:stretch>
@@ -11353,7 +11662,7 @@
           <p:nvPr/>
         </p:nvPicPr>
         <p:blipFill>
-          <a:blip r:embed="rId14"/>
+          <a:blip r:embed="rId12"/>
           <a:stretch>
             <a:fillRect/>
           </a:stretch>
@@ -11383,7 +11692,7 @@
           <p:nvPr/>
         </p:nvPicPr>
         <p:blipFill>
-          <a:blip r:embed="rId15"/>
+          <a:blip r:embed="rId13"/>
           <a:stretch>
             <a:fillRect/>
           </a:stretch>

</xml_diff>